<commit_message>
CSS: Navbar & Add favicon file
</commit_message>
<xml_diff>
--- a/pre/wireframe.pptx
+++ b/pre/wireframe.pptx
@@ -29537,7 +29537,7 @@
                 </a:solidFill>
                 <a:latin typeface="Arial Black" panose="020B0A04020102020204" pitchFamily="34" charset="0"/>
               </a:rPr>
-              <a:t>IogoImg</a:t>
+              <a:t>itemImg</a:t>
             </a:r>
             <a:endParaRPr lang="en-US" sz="1600" dirty="0">
               <a:solidFill>
@@ -29643,7 +29643,7 @@
                 </a:solidFill>
                 <a:latin typeface="Arial Black" panose="020B0A04020102020204" pitchFamily="34" charset="0"/>
               </a:rPr>
-              <a:t>IogoImg</a:t>
+              <a:t>itemesc</a:t>
             </a:r>
             <a:endParaRPr lang="en-US" sz="1600" dirty="0">
               <a:solidFill>

</xml_diff>